<commit_message>
Latest updates to project
</commit_message>
<xml_diff>
--- a/rapor ve sunum/Türkiye ve Yurtdışı Karşılaştırmalı Veri Analizi.pptx
+++ b/rapor ve sunum/Türkiye ve Yurtdışı Karşılaştırmalı Veri Analizi.pptx
@@ -5,7 +5,7 @@
     <p:sldMasterId id="2147483660" r:id="rId4"/>
   </p:sldMasterIdLst>
   <p:notesMasterIdLst>
-    <p:notesMasterId r:id="rId33"/>
+    <p:notesMasterId r:id="rId34"/>
   </p:notesMasterIdLst>
   <p:sldIdLst>
     <p:sldId id="298" r:id="rId5"/>
@@ -33,9 +33,10 @@
     <p:sldId id="321" r:id="rId27"/>
     <p:sldId id="322" r:id="rId28"/>
     <p:sldId id="323" r:id="rId29"/>
-    <p:sldId id="324" r:id="rId30"/>
-    <p:sldId id="325" r:id="rId31"/>
-    <p:sldId id="326" r:id="rId32"/>
+    <p:sldId id="328" r:id="rId30"/>
+    <p:sldId id="324" r:id="rId31"/>
+    <p:sldId id="325" r:id="rId32"/>
+    <p:sldId id="326" r:id="rId33"/>
   </p:sldIdLst>
   <p:sldSz cx="12192000" cy="6858000"/>
   <p:notesSz cx="6858000" cy="9144000"/>
@@ -250,7 +251,7 @@
           <a:p>
             <a:fld id="{A7D0BE14-B99E-40D2-AE7F-C3599B1CD52C}" type="datetimeFigureOut">
               <a:rPr lang="en-US" smtClean="0"/>
-              <a:t>12/20/2020</a:t>
+              <a:t>12/24/2020</a:t>
             </a:fld>
             <a:endParaRPr lang="en-US"/>
           </a:p>
@@ -845,7 +846,7 @@
           <a:p>
             <a:fld id="{9184DA70-C731-4C70-880D-CCD4705E623C}" type="datetime1">
               <a:rPr lang="en-US" smtClean="0"/>
-              <a:t>12/20/2020</a:t>
+              <a:t>12/24/2020</a:t>
             </a:fld>
             <a:endParaRPr lang="en-US" dirty="0"/>
           </a:p>
@@ -1033,7 +1034,7 @@
           <a:p>
             <a:fld id="{4BE1D723-8F53-4F53-90B0-1982A396982E}" type="datetime1">
               <a:rPr lang="en-US" smtClean="0"/>
-              <a:t>12/20/2020</a:t>
+              <a:t>12/24/2020</a:t>
             </a:fld>
             <a:endParaRPr lang="en-US" dirty="0"/>
           </a:p>
@@ -1406,7 +1407,7 @@
           <a:p>
             <a:fld id="{97669AF7-7BEB-44E4-9852-375E34362B5B}" type="datetime1">
               <a:rPr lang="en-US" smtClean="0"/>
-              <a:t>12/20/2020</a:t>
+              <a:t>12/24/2020</a:t>
             </a:fld>
             <a:endParaRPr lang="en-US" dirty="0"/>
           </a:p>
@@ -1661,7 +1662,7 @@
           <a:p>
             <a:fld id="{BAAAC38D-0552-4C82-B593-E6124DFADBE2}" type="datetime1">
               <a:rPr lang="en-US" smtClean="0"/>
-              <a:t>12/20/2020</a:t>
+              <a:t>12/24/2020</a:t>
             </a:fld>
             <a:endParaRPr lang="en-US" dirty="0"/>
           </a:p>
@@ -2058,7 +2059,7 @@
           <a:p>
             <a:fld id="{D9DF0F1C-5577-4ACB-BB62-DF8F3C494C7E}" type="datetime1">
               <a:rPr lang="en-US" smtClean="0"/>
-              <a:t>12/20/2020</a:t>
+              <a:t>12/24/2020</a:t>
             </a:fld>
             <a:endParaRPr lang="en-US" dirty="0"/>
           </a:p>
@@ -2194,7 +2195,7 @@
           <a:p>
             <a:fld id="{1775B394-D9F9-4F0C-B15D-605F45CB9E9F}" type="datetime1">
               <a:rPr lang="en-US" smtClean="0"/>
-              <a:t>12/20/2020</a:t>
+              <a:t>12/24/2020</a:t>
             </a:fld>
             <a:endParaRPr lang="en-US" dirty="0"/>
           </a:p>
@@ -2351,7 +2352,7 @@
           <a:p>
             <a:fld id="{39667345-2558-425A-8533-9BFDBCE15005}" type="datetime1">
               <a:rPr lang="en-US" smtClean="0"/>
-              <a:t>12/20/2020</a:t>
+              <a:t>12/24/2020</a:t>
             </a:fld>
             <a:endParaRPr lang="en-US" dirty="0"/>
           </a:p>
@@ -2680,7 +2681,7 @@
           <a:p>
             <a:fld id="{92BEA474-078D-4E9B-9B14-09A87B19DC46}" type="datetime1">
               <a:rPr lang="en-US" smtClean="0"/>
-              <a:t>12/20/2020</a:t>
+              <a:t>12/24/2020</a:t>
             </a:fld>
             <a:endParaRPr lang="en-US" dirty="0"/>
           </a:p>
@@ -3030,7 +3031,7 @@
           <a:p>
             <a:fld id="{4907D986-8816-4272-A432-0437A28A9828}" type="datetime1">
               <a:rPr lang="en-US" smtClean="0"/>
-              <a:t>12/20/2020</a:t>
+              <a:t>12/24/2020</a:t>
             </a:fld>
             <a:endParaRPr lang="en-US" dirty="0"/>
           </a:p>
@@ -3291,7 +3292,7 @@
           <a:p>
             <a:fld id="{62D6E202-B606-4609-B914-27C9371A1F6D}" type="datetime1">
               <a:rPr lang="en-US" smtClean="0"/>
-              <a:t>12/20/2020</a:t>
+              <a:t>12/24/2020</a:t>
             </a:fld>
             <a:endParaRPr lang="en-US" dirty="0"/>
           </a:p>
@@ -4102,15 +4103,15 @@
               <a:t>Yurtdışı</a:t>
             </a:r>
             <a:r>
-              <a:rPr lang="en-US" sz="3800" dirty="0">
+              <a:rPr lang="tr-TR" sz="3800">
                 <a:solidFill>
                   <a:schemeClr val="tx1"/>
                 </a:solidFill>
               </a:rPr>
-              <a:t> </a:t>
-            </a:r>
-            <a:r>
-              <a:rPr lang="en-US" sz="3800" dirty="0" err="1">
+              <a:t> E-Ticaret </a:t>
+            </a:r>
+            <a:r>
+              <a:rPr lang="en-US" sz="3800">
                 <a:solidFill>
                   <a:schemeClr val="tx1"/>
                 </a:solidFill>
@@ -4771,7 +4772,7 @@
                 <a:latin typeface="Times New Roman" panose="02020603050405020304" pitchFamily="18" charset="0"/>
                 <a:ea typeface="Calibri" panose="020F0502020204030204" pitchFamily="34" charset="0"/>
               </a:rPr>
-              <a:t>Projenin temel amacı olan ileri tarihli piyasa hacim tahmini için PANDAS’tan elde edilen sonuçlar üzerinden PROPHET kütüphanesi yardmıyla finansal veriler üstüne regresyon analizi yapabilme kabiliyeti ile ileri tarihli tahmin yapılabilmesini sağlamaktadır. </a:t>
+              <a:t>Projenin temel amacı olan ileri tarihli piyasa hacim tahmini için PANDAS’tan elde edilen sonuçlar üzerinden PROPHET kütüphanesi yardımıyla finansal veriler üstüne regresyon analizi yapabilme kabiliyeti ile ileri tarihli tahmin yapılabilmesini sağlamaktadır. </a:t>
             </a:r>
             <a:r>
               <a:rPr lang="tr-TR" sz="2500" b="1" dirty="0">
@@ -5243,7 +5244,7 @@
                 <a:latin typeface="Times New Roman" panose="02020603050405020304" pitchFamily="18" charset="0"/>
                 <a:ea typeface="Times New Roman" panose="02020603050405020304" pitchFamily="18" charset="0"/>
               </a:rPr>
-              <a:t>Veri setleri üzerinde işlem yapılabilmesi </a:t>
+              <a:t>Veri setleri üzerinde işlem yapılabilmesi için </a:t>
             </a:r>
             <a:r>
               <a:rPr lang="tr-TR" sz="2000" b="1" i="0" dirty="0">
@@ -5346,7 +5347,24 @@
                 <a:ea typeface="Calibri" panose="020F0502020204030204" pitchFamily="34" charset="0"/>
                 <a:cs typeface="Times New Roman" panose="02020603050405020304" pitchFamily="18" charset="0"/>
               </a:rPr>
-              <a:t>İleri tarihli tahmin uygulaması için SKLEARN seçilmiştir. </a:t>
+              <a:t>İleri tarihli tahmin uygulaması için </a:t>
+            </a:r>
+            <a:r>
+              <a:rPr lang="tr-TR" sz="2000" b="1" dirty="0">
+                <a:latin typeface="Times New Roman" panose="02020603050405020304" pitchFamily="18" charset="0"/>
+                <a:ea typeface="Calibri" panose="020F0502020204030204" pitchFamily="34" charset="0"/>
+                <a:cs typeface="Times New Roman" panose="02020603050405020304" pitchFamily="18" charset="0"/>
+              </a:rPr>
+              <a:t>PROPHET</a:t>
+            </a:r>
+            <a:r>
+              <a:rPr lang="tr-TR" sz="2000" dirty="0">
+                <a:effectLst/>
+                <a:latin typeface="Times New Roman" panose="02020603050405020304" pitchFamily="18" charset="0"/>
+                <a:ea typeface="Calibri" panose="020F0502020204030204" pitchFamily="34" charset="0"/>
+                <a:cs typeface="Times New Roman" panose="02020603050405020304" pitchFamily="18" charset="0"/>
+              </a:rPr>
+              <a:t> seçilmiştir. </a:t>
             </a:r>
           </a:p>
           <a:p>
@@ -5885,31 +5903,6 @@
           <a:chExt cx="0" cy="0"/>
         </a:xfrm>
       </p:grpSpPr>
-      <p:sp>
-        <p:nvSpPr>
-          <p:cNvPr id="2" name="Title 1">
-            <a:extLst>
-              <a:ext uri="{FF2B5EF4-FFF2-40B4-BE49-F238E27FC236}">
-                <a16:creationId xmlns:a16="http://schemas.microsoft.com/office/drawing/2014/main" id="{3BCB782E-666B-4E48-A1BB-3E3BA8B5C5D5}"/>
-              </a:ext>
-            </a:extLst>
-          </p:cNvPr>
-          <p:cNvSpPr>
-            <a:spLocks noGrp="1"/>
-          </p:cNvSpPr>
-          <p:nvPr>
-            <p:ph type="title"/>
-          </p:nvPr>
-        </p:nvSpPr>
-        <p:spPr/>
-        <p:txBody>
-          <a:bodyPr/>
-          <a:lstStyle/>
-          <a:p>
-            <a:endParaRPr lang="en-US"/>
-          </a:p>
-        </p:txBody>
-      </p:sp>
       <p:pic>
         <p:nvPicPr>
           <p:cNvPr id="4" name="Content Placeholder 3">
@@ -5923,7 +5916,7 @@
             <a:picLocks noGrp="1" noChangeAspect="1"/>
           </p:cNvPicPr>
           <p:nvPr>
-            <p:ph idx="1"/>
+            <p:ph idx="4294967295"/>
           </p:nvPr>
         </p:nvPicPr>
         <p:blipFill>
@@ -5933,8 +5926,8 @@
         </p:blipFill>
         <p:spPr>
           <a:xfrm>
-            <a:off x="3730142" y="2520860"/>
-            <a:ext cx="4792042" cy="2935468"/>
+            <a:off x="6239185" y="923925"/>
+            <a:ext cx="5905500" cy="3617913"/>
           </a:xfrm>
           <a:prstGeom prst="rect">
             <a:avLst/>
@@ -5955,7 +5948,7 @@
         </p:nvSpPr>
         <p:spPr>
           <a:xfrm>
-            <a:off x="3187570" y="5868988"/>
+            <a:off x="6144324" y="4541838"/>
             <a:ext cx="6095222" cy="390684"/>
           </a:xfrm>
           <a:prstGeom prst="rect">
@@ -5995,6 +5988,42 @@
               <a:ea typeface="Calibri" panose="020F0502020204030204" pitchFamily="34" charset="0"/>
               <a:cs typeface="Times New Roman" panose="02020603050405020304" pitchFamily="18" charset="0"/>
             </a:endParaRPr>
+          </a:p>
+        </p:txBody>
+      </p:sp>
+      <p:sp>
+        <p:nvSpPr>
+          <p:cNvPr id="3" name="TextBox 2">
+            <a:extLst>
+              <a:ext uri="{FF2B5EF4-FFF2-40B4-BE49-F238E27FC236}">
+                <a16:creationId xmlns:a16="http://schemas.microsoft.com/office/drawing/2014/main" id="{65A76EC3-7608-409B-B7A1-7E9B2377C3D1}"/>
+              </a:ext>
+            </a:extLst>
+          </p:cNvPr>
+          <p:cNvSpPr txBox="1"/>
+          <p:nvPr/>
+        </p:nvSpPr>
+        <p:spPr>
+          <a:xfrm>
+            <a:off x="718761" y="2284892"/>
+            <a:ext cx="5611155" cy="646331"/>
+          </a:xfrm>
+          <a:prstGeom prst="rect">
+            <a:avLst/>
+          </a:prstGeom>
+          <a:noFill/>
+        </p:spPr>
+        <p:txBody>
+          <a:bodyPr wrap="square" rtlCol="0">
+            <a:spAutoFit/>
+          </a:bodyPr>
+          <a:lstStyle/>
+          <a:p>
+            <a:r>
+              <a:rPr lang="tr-TR" dirty="0"/>
+              <a:t>Dolar kurunun YTL’ye çevriminden sonra doğrulanmış grafik şekil 2’de ki  gibidir.</a:t>
+            </a:r>
+            <a:endParaRPr lang="en-US" dirty="0"/>
           </a:p>
         </p:txBody>
       </p:sp>
@@ -8132,7 +8161,7 @@
           <p:cNvPr id="2" name="Title 1">
             <a:extLst>
               <a:ext uri="{FF2B5EF4-FFF2-40B4-BE49-F238E27FC236}">
-                <a16:creationId xmlns:a16="http://schemas.microsoft.com/office/drawing/2014/main" id="{29943F7A-82BE-4994-8FEF-0925FF9C7B0A}"/>
+                <a16:creationId xmlns:a16="http://schemas.microsoft.com/office/drawing/2014/main" id="{E0266FB8-EEA5-4FD7-AAD5-5A1170224171}"/>
               </a:ext>
             </a:extLst>
           </p:cNvPr>
@@ -8143,26 +8172,18 @@
             <p:ph type="title"/>
           </p:nvPr>
         </p:nvSpPr>
-        <p:spPr>
-          <a:xfrm>
-            <a:off x="1097280" y="286604"/>
-            <a:ext cx="10058400" cy="1024347"/>
-          </a:xfrm>
-        </p:spPr>
-        <p:txBody>
-          <a:bodyPr>
-            <a:normAutofit/>
-          </a:bodyPr>
+        <p:spPr/>
+        <p:txBody>
+          <a:bodyPr/>
           <a:lstStyle/>
           <a:p>
-            <a:pPr algn="ctr"/>
-            <a:r>
-              <a:rPr lang="tr-TR" sz="4800" b="1" dirty="0">
-                <a:latin typeface="Times New Roman" panose="02020603050405020304" pitchFamily="18" charset="0"/>
-                <a:ea typeface="Calibri" panose="020F0502020204030204" pitchFamily="34" charset="0"/>
-                <a:cs typeface="Times New Roman" panose="02020603050405020304" pitchFamily="18" charset="0"/>
-              </a:rPr>
-              <a:t>Sonuç</a:t>
+            <a:r>
+              <a:rPr lang="en-US" dirty="0"/>
+              <a:t>Model </a:t>
+            </a:r>
+            <a:r>
+              <a:rPr lang="en-US" dirty="0" err="1"/>
+              <a:t>Sorunu</a:t>
             </a:r>
             <a:endParaRPr lang="en-US" dirty="0"/>
           </a:p>
@@ -8173,7 +8194,7 @@
           <p:cNvPr id="3" name="Content Placeholder 2">
             <a:extLst>
               <a:ext uri="{FF2B5EF4-FFF2-40B4-BE49-F238E27FC236}">
-                <a16:creationId xmlns:a16="http://schemas.microsoft.com/office/drawing/2014/main" id="{B7A61982-5912-4F43-AA94-3BD1213C9C96}"/>
+                <a16:creationId xmlns:a16="http://schemas.microsoft.com/office/drawing/2014/main" id="{06F417DB-7762-445C-81F9-74D795DC4F94}"/>
               </a:ext>
             </a:extLst>
           </p:cNvPr>
@@ -8186,193 +8207,20 @@
         </p:nvSpPr>
         <p:spPr/>
         <p:txBody>
-          <a:bodyPr>
-            <a:normAutofit/>
-          </a:bodyPr>
+          <a:bodyPr/>
           <a:lstStyle/>
           <a:p>
-            <a:pPr marL="0" marR="0" algn="just">
-              <a:lnSpc>
-                <a:spcPct val="115000"/>
-              </a:lnSpc>
-              <a:spcBef>
-                <a:spcPts val="0"/>
-              </a:spcBef>
-              <a:spcAft>
-                <a:spcPts val="1000"/>
-              </a:spcAft>
-            </a:pPr>
-            <a:r>
-              <a:rPr lang="tr-TR" sz="1800" dirty="0">
-                <a:effectLst/>
-                <a:latin typeface="Times New Roman" panose="02020603050405020304" pitchFamily="18" charset="0"/>
-                <a:ea typeface="Calibri" panose="020F0502020204030204" pitchFamily="34" charset="0"/>
-                <a:cs typeface="Times New Roman" panose="02020603050405020304" pitchFamily="18" charset="0"/>
-              </a:rPr>
-              <a:t>     Araştırma sonucunda:</a:t>
-            </a:r>
-          </a:p>
-          <a:p>
-            <a:pPr marL="0" marR="0" indent="0" algn="just">
-              <a:lnSpc>
-                <a:spcPct val="115000"/>
-              </a:lnSpc>
-              <a:spcBef>
-                <a:spcPts val="0"/>
-              </a:spcBef>
-              <a:spcAft>
-                <a:spcPts val="1000"/>
-              </a:spcAft>
-              <a:buNone/>
-            </a:pPr>
-            <a:r>
-              <a:rPr lang="tr-TR" sz="1800" dirty="0">
-                <a:effectLst/>
-                <a:latin typeface="Times New Roman" panose="02020603050405020304" pitchFamily="18" charset="0"/>
-                <a:ea typeface="Calibri" panose="020F0502020204030204" pitchFamily="34" charset="0"/>
-                <a:cs typeface="Times New Roman" panose="02020603050405020304" pitchFamily="18" charset="0"/>
-              </a:rPr>
-              <a:t>1. E-ticaret hacminin dünya çapında </a:t>
-            </a:r>
-            <a:r>
-              <a:rPr lang="tr-TR" sz="1800" b="1" u="sng" dirty="0">
-                <a:effectLst/>
-                <a:latin typeface="Times New Roman" panose="02020603050405020304" pitchFamily="18" charset="0"/>
-                <a:ea typeface="Calibri" panose="020F0502020204030204" pitchFamily="34" charset="0"/>
-                <a:cs typeface="Times New Roman" panose="02020603050405020304" pitchFamily="18" charset="0"/>
-              </a:rPr>
-              <a:t>giderek artacağı </a:t>
-            </a:r>
-          </a:p>
-          <a:p>
-            <a:pPr marL="0" marR="0" indent="0" algn="just">
-              <a:lnSpc>
-                <a:spcPct val="115000"/>
-              </a:lnSpc>
-              <a:spcBef>
-                <a:spcPts val="0"/>
-              </a:spcBef>
-              <a:spcAft>
-                <a:spcPts val="1000"/>
-              </a:spcAft>
-              <a:buNone/>
-            </a:pPr>
-            <a:r>
-              <a:rPr lang="tr-TR" sz="1800" dirty="0">
-                <a:effectLst/>
-                <a:latin typeface="Times New Roman" panose="02020603050405020304" pitchFamily="18" charset="0"/>
-                <a:ea typeface="Calibri" panose="020F0502020204030204" pitchFamily="34" charset="0"/>
-                <a:cs typeface="Times New Roman" panose="02020603050405020304" pitchFamily="18" charset="0"/>
-              </a:rPr>
-              <a:t>2. Model içinde değişkenler arttırılarak </a:t>
-            </a:r>
-            <a:r>
-              <a:rPr lang="tr-TR" sz="1800" b="1" u="sng" dirty="0">
-                <a:effectLst/>
-                <a:latin typeface="Times New Roman" panose="02020603050405020304" pitchFamily="18" charset="0"/>
-                <a:ea typeface="Calibri" panose="020F0502020204030204" pitchFamily="34" charset="0"/>
-                <a:cs typeface="Times New Roman" panose="02020603050405020304" pitchFamily="18" charset="0"/>
-              </a:rPr>
-              <a:t>trendlerin belirlenebileceği </a:t>
-            </a:r>
-            <a:r>
-              <a:rPr lang="tr-TR" sz="1800" dirty="0">
-                <a:effectLst/>
-                <a:latin typeface="Times New Roman" panose="02020603050405020304" pitchFamily="18" charset="0"/>
-                <a:ea typeface="Calibri" panose="020F0502020204030204" pitchFamily="34" charset="0"/>
-                <a:cs typeface="Times New Roman" panose="02020603050405020304" pitchFamily="18" charset="0"/>
-              </a:rPr>
-              <a:t>çıkarımı yapılabilir. </a:t>
-            </a:r>
-          </a:p>
-          <a:p>
-            <a:pPr marL="0" marR="0" indent="0" algn="just">
-              <a:lnSpc>
-                <a:spcPct val="115000"/>
-              </a:lnSpc>
-              <a:spcBef>
-                <a:spcPts val="0"/>
-              </a:spcBef>
-              <a:spcAft>
-                <a:spcPts val="1000"/>
-              </a:spcAft>
-              <a:buNone/>
-            </a:pPr>
-            <a:r>
-              <a:rPr lang="tr-TR" sz="1800" dirty="0">
-                <a:latin typeface="Times New Roman" panose="02020603050405020304" pitchFamily="18" charset="0"/>
-                <a:ea typeface="Calibri" panose="020F0502020204030204" pitchFamily="34" charset="0"/>
-                <a:cs typeface="Times New Roman" panose="02020603050405020304" pitchFamily="18" charset="0"/>
-              </a:rPr>
-              <a:t>3. </a:t>
-            </a:r>
-            <a:r>
-              <a:rPr lang="tr-TR" sz="1800" dirty="0">
-                <a:effectLst/>
-                <a:latin typeface="Times New Roman" panose="02020603050405020304" pitchFamily="18" charset="0"/>
-                <a:ea typeface="Calibri" panose="020F0502020204030204" pitchFamily="34" charset="0"/>
-                <a:cs typeface="Times New Roman" panose="02020603050405020304" pitchFamily="18" charset="0"/>
-              </a:rPr>
-              <a:t>Yapılan model geliştirilerek </a:t>
-            </a:r>
-            <a:r>
-              <a:rPr lang="tr-TR" sz="1800" b="1" u="sng" dirty="0">
-                <a:effectLst/>
-                <a:latin typeface="Times New Roman" panose="02020603050405020304" pitchFamily="18" charset="0"/>
-                <a:ea typeface="Calibri" panose="020F0502020204030204" pitchFamily="34" charset="0"/>
-                <a:cs typeface="Times New Roman" panose="02020603050405020304" pitchFamily="18" charset="0"/>
-              </a:rPr>
-              <a:t>araştırma amacına </a:t>
-            </a:r>
-            <a:r>
-              <a:rPr lang="tr-TR" sz="1800" dirty="0">
-                <a:effectLst/>
-                <a:latin typeface="Times New Roman" panose="02020603050405020304" pitchFamily="18" charset="0"/>
-                <a:ea typeface="Calibri" panose="020F0502020204030204" pitchFamily="34" charset="0"/>
-                <a:cs typeface="Times New Roman" panose="02020603050405020304" pitchFamily="18" charset="0"/>
-              </a:rPr>
-              <a:t>göre uygulanabilir</a:t>
-            </a:r>
-          </a:p>
-          <a:p>
-            <a:pPr marL="0" marR="0" indent="0" algn="just">
-              <a:lnSpc>
-                <a:spcPct val="115000"/>
-              </a:lnSpc>
-              <a:spcBef>
-                <a:spcPts val="0"/>
-              </a:spcBef>
-              <a:spcAft>
-                <a:spcPts val="1000"/>
-              </a:spcAft>
-              <a:buNone/>
-            </a:pPr>
-            <a:r>
-              <a:rPr lang="tr-TR" sz="1800" dirty="0">
-                <a:effectLst/>
-                <a:latin typeface="Times New Roman" panose="02020603050405020304" pitchFamily="18" charset="0"/>
-                <a:ea typeface="Calibri" panose="020F0502020204030204" pitchFamily="34" charset="0"/>
-                <a:cs typeface="Times New Roman" panose="02020603050405020304" pitchFamily="18" charset="0"/>
-              </a:rPr>
-              <a:t>4. Gerçek zamanlı sistemler üzerinden </a:t>
-            </a:r>
-            <a:r>
-              <a:rPr lang="tr-TR" sz="1800" b="1" u="sng" dirty="0">
-                <a:effectLst/>
-                <a:latin typeface="Times New Roman" panose="02020603050405020304" pitchFamily="18" charset="0"/>
-                <a:ea typeface="Calibri" panose="020F0502020204030204" pitchFamily="34" charset="0"/>
-                <a:cs typeface="Times New Roman" panose="02020603050405020304" pitchFamily="18" charset="0"/>
-              </a:rPr>
-              <a:t>ileri zamanlı tahminler </a:t>
-            </a:r>
-            <a:r>
-              <a:rPr lang="tr-TR" sz="1800" dirty="0">
-                <a:effectLst/>
-                <a:latin typeface="Times New Roman" panose="02020603050405020304" pitchFamily="18" charset="0"/>
-                <a:ea typeface="Calibri" panose="020F0502020204030204" pitchFamily="34" charset="0"/>
-                <a:cs typeface="Times New Roman" panose="02020603050405020304" pitchFamily="18" charset="0"/>
-              </a:rPr>
-              <a:t>yapılabilmesini sağlayabilir. </a:t>
+            <a:r>
+              <a:rPr lang="en-US" dirty="0"/>
+              <a:t>Korona </a:t>
+            </a:r>
+            <a:r>
+              <a:rPr lang="en-US" dirty="0" err="1"/>
+              <a:t>pandemi</a:t>
+            </a:r>
+            <a:r>
+              <a:rPr lang="tr-TR" dirty="0"/>
+              <a:t> süreci yüzünden Türkiye için model 2020 ilk çeyreğinden tahmin edilecek tarih için hata oranını yüksek göstermektedir. Bu problemin çözülebilmesi için korona sürecinin trend analizi gerekmektedir ama yetersiz veriden dolayı analizi yapılamamaktadır. Model senelik trendler üzerinden çalıştığı için istisnai durumlar liste olarak belirlenebilir ve modele uygulanabilir ama pandemi süreci uzun ve yüksek etkili bir istisna olduğu için modelin tahmini üstünde negatif etkisi yüksektir.</a:t>
             </a:r>
             <a:endParaRPr lang="en-US" dirty="0"/>
           </a:p>
@@ -8381,7 +8229,7 @@
     </p:spTree>
     <p:extLst>
       <p:ext uri="{BB962C8B-B14F-4D97-AF65-F5344CB8AC3E}">
-        <p14:creationId xmlns:p14="http://schemas.microsoft.com/office/powerpoint/2010/main" val="1613052367"/>
+        <p14:creationId xmlns:p14="http://schemas.microsoft.com/office/powerpoint/2010/main" val="2512943593"/>
       </p:ext>
     </p:extLst>
   </p:cSld>
@@ -8413,6 +8261,287 @@
           <p:cNvPr id="2" name="Title 1">
             <a:extLst>
               <a:ext uri="{FF2B5EF4-FFF2-40B4-BE49-F238E27FC236}">
+                <a16:creationId xmlns:a16="http://schemas.microsoft.com/office/drawing/2014/main" id="{29943F7A-82BE-4994-8FEF-0925FF9C7B0A}"/>
+              </a:ext>
+            </a:extLst>
+          </p:cNvPr>
+          <p:cNvSpPr>
+            <a:spLocks noGrp="1"/>
+          </p:cNvSpPr>
+          <p:nvPr>
+            <p:ph type="title"/>
+          </p:nvPr>
+        </p:nvSpPr>
+        <p:spPr>
+          <a:xfrm>
+            <a:off x="1097280" y="286604"/>
+            <a:ext cx="10058400" cy="1024347"/>
+          </a:xfrm>
+        </p:spPr>
+        <p:txBody>
+          <a:bodyPr>
+            <a:normAutofit/>
+          </a:bodyPr>
+          <a:lstStyle/>
+          <a:p>
+            <a:pPr algn="ctr"/>
+            <a:r>
+              <a:rPr lang="tr-TR" sz="4800" b="1" dirty="0">
+                <a:latin typeface="Times New Roman" panose="02020603050405020304" pitchFamily="18" charset="0"/>
+                <a:ea typeface="Calibri" panose="020F0502020204030204" pitchFamily="34" charset="0"/>
+                <a:cs typeface="Times New Roman" panose="02020603050405020304" pitchFamily="18" charset="0"/>
+              </a:rPr>
+              <a:t>Sonuç</a:t>
+            </a:r>
+            <a:endParaRPr lang="en-US" dirty="0"/>
+          </a:p>
+        </p:txBody>
+      </p:sp>
+      <p:sp>
+        <p:nvSpPr>
+          <p:cNvPr id="3" name="Content Placeholder 2">
+            <a:extLst>
+              <a:ext uri="{FF2B5EF4-FFF2-40B4-BE49-F238E27FC236}">
+                <a16:creationId xmlns:a16="http://schemas.microsoft.com/office/drawing/2014/main" id="{B7A61982-5912-4F43-AA94-3BD1213C9C96}"/>
+              </a:ext>
+            </a:extLst>
+          </p:cNvPr>
+          <p:cNvSpPr>
+            <a:spLocks noGrp="1"/>
+          </p:cNvSpPr>
+          <p:nvPr>
+            <p:ph idx="1"/>
+          </p:nvPr>
+        </p:nvSpPr>
+        <p:spPr/>
+        <p:txBody>
+          <a:bodyPr>
+            <a:normAutofit/>
+          </a:bodyPr>
+          <a:lstStyle/>
+          <a:p>
+            <a:pPr marL="0" marR="0" algn="just">
+              <a:lnSpc>
+                <a:spcPct val="115000"/>
+              </a:lnSpc>
+              <a:spcBef>
+                <a:spcPts val="0"/>
+              </a:spcBef>
+              <a:spcAft>
+                <a:spcPts val="1000"/>
+              </a:spcAft>
+            </a:pPr>
+            <a:r>
+              <a:rPr lang="tr-TR" sz="1800" dirty="0">
+                <a:effectLst/>
+                <a:latin typeface="Times New Roman" panose="02020603050405020304" pitchFamily="18" charset="0"/>
+                <a:ea typeface="Calibri" panose="020F0502020204030204" pitchFamily="34" charset="0"/>
+                <a:cs typeface="Times New Roman" panose="02020603050405020304" pitchFamily="18" charset="0"/>
+              </a:rPr>
+              <a:t>     Araştırma sonucunda:</a:t>
+            </a:r>
+          </a:p>
+          <a:p>
+            <a:pPr marL="0" marR="0" indent="0" algn="just">
+              <a:lnSpc>
+                <a:spcPct val="115000"/>
+              </a:lnSpc>
+              <a:spcBef>
+                <a:spcPts val="0"/>
+              </a:spcBef>
+              <a:spcAft>
+                <a:spcPts val="1000"/>
+              </a:spcAft>
+              <a:buNone/>
+            </a:pPr>
+            <a:r>
+              <a:rPr lang="tr-TR" sz="1800" dirty="0">
+                <a:effectLst/>
+                <a:latin typeface="Times New Roman" panose="02020603050405020304" pitchFamily="18" charset="0"/>
+                <a:ea typeface="Calibri" panose="020F0502020204030204" pitchFamily="34" charset="0"/>
+                <a:cs typeface="Times New Roman" panose="02020603050405020304" pitchFamily="18" charset="0"/>
+              </a:rPr>
+              <a:t>1. E-ticaret hacminin dünya çapında </a:t>
+            </a:r>
+            <a:r>
+              <a:rPr lang="tr-TR" sz="1800" b="1" u="sng" dirty="0">
+                <a:effectLst/>
+                <a:latin typeface="Times New Roman" panose="02020603050405020304" pitchFamily="18" charset="0"/>
+                <a:ea typeface="Calibri" panose="020F0502020204030204" pitchFamily="34" charset="0"/>
+                <a:cs typeface="Times New Roman" panose="02020603050405020304" pitchFamily="18" charset="0"/>
+              </a:rPr>
+              <a:t>giderek artacağı </a:t>
+            </a:r>
+          </a:p>
+          <a:p>
+            <a:pPr marL="0" marR="0" indent="0" algn="just">
+              <a:lnSpc>
+                <a:spcPct val="115000"/>
+              </a:lnSpc>
+              <a:spcBef>
+                <a:spcPts val="0"/>
+              </a:spcBef>
+              <a:spcAft>
+                <a:spcPts val="1000"/>
+              </a:spcAft>
+              <a:buNone/>
+            </a:pPr>
+            <a:r>
+              <a:rPr lang="tr-TR" sz="1800" dirty="0">
+                <a:effectLst/>
+                <a:latin typeface="Times New Roman" panose="02020603050405020304" pitchFamily="18" charset="0"/>
+                <a:ea typeface="Calibri" panose="020F0502020204030204" pitchFamily="34" charset="0"/>
+                <a:cs typeface="Times New Roman" panose="02020603050405020304" pitchFamily="18" charset="0"/>
+              </a:rPr>
+              <a:t>2. Model içinde değişkenler arttırılarak </a:t>
+            </a:r>
+            <a:r>
+              <a:rPr lang="tr-TR" sz="1800" b="1" u="sng" dirty="0">
+                <a:effectLst/>
+                <a:latin typeface="Times New Roman" panose="02020603050405020304" pitchFamily="18" charset="0"/>
+                <a:ea typeface="Calibri" panose="020F0502020204030204" pitchFamily="34" charset="0"/>
+                <a:cs typeface="Times New Roman" panose="02020603050405020304" pitchFamily="18" charset="0"/>
+              </a:rPr>
+              <a:t>trendlerin belirlenebileceği </a:t>
+            </a:r>
+            <a:r>
+              <a:rPr lang="tr-TR" sz="1800" dirty="0">
+                <a:effectLst/>
+                <a:latin typeface="Times New Roman" panose="02020603050405020304" pitchFamily="18" charset="0"/>
+                <a:ea typeface="Calibri" panose="020F0502020204030204" pitchFamily="34" charset="0"/>
+                <a:cs typeface="Times New Roman" panose="02020603050405020304" pitchFamily="18" charset="0"/>
+              </a:rPr>
+              <a:t>çıkarımı yapılabilir. </a:t>
+            </a:r>
+          </a:p>
+          <a:p>
+            <a:pPr marL="0" marR="0" indent="0" algn="just">
+              <a:lnSpc>
+                <a:spcPct val="115000"/>
+              </a:lnSpc>
+              <a:spcBef>
+                <a:spcPts val="0"/>
+              </a:spcBef>
+              <a:spcAft>
+                <a:spcPts val="1000"/>
+              </a:spcAft>
+              <a:buNone/>
+            </a:pPr>
+            <a:r>
+              <a:rPr lang="tr-TR" sz="1800" dirty="0">
+                <a:latin typeface="Times New Roman" panose="02020603050405020304" pitchFamily="18" charset="0"/>
+                <a:ea typeface="Calibri" panose="020F0502020204030204" pitchFamily="34" charset="0"/>
+                <a:cs typeface="Times New Roman" panose="02020603050405020304" pitchFamily="18" charset="0"/>
+              </a:rPr>
+              <a:t>3. </a:t>
+            </a:r>
+            <a:r>
+              <a:rPr lang="tr-TR" sz="1800" dirty="0">
+                <a:effectLst/>
+                <a:latin typeface="Times New Roman" panose="02020603050405020304" pitchFamily="18" charset="0"/>
+                <a:ea typeface="Calibri" panose="020F0502020204030204" pitchFamily="34" charset="0"/>
+                <a:cs typeface="Times New Roman" panose="02020603050405020304" pitchFamily="18" charset="0"/>
+              </a:rPr>
+              <a:t>Yapılan model geliştirilerek </a:t>
+            </a:r>
+            <a:r>
+              <a:rPr lang="tr-TR" sz="1800" b="1" u="sng" dirty="0">
+                <a:effectLst/>
+                <a:latin typeface="Times New Roman" panose="02020603050405020304" pitchFamily="18" charset="0"/>
+                <a:ea typeface="Calibri" panose="020F0502020204030204" pitchFamily="34" charset="0"/>
+                <a:cs typeface="Times New Roman" panose="02020603050405020304" pitchFamily="18" charset="0"/>
+              </a:rPr>
+              <a:t>araştırma amacına </a:t>
+            </a:r>
+            <a:r>
+              <a:rPr lang="tr-TR" sz="1800" dirty="0">
+                <a:effectLst/>
+                <a:latin typeface="Times New Roman" panose="02020603050405020304" pitchFamily="18" charset="0"/>
+                <a:ea typeface="Calibri" panose="020F0502020204030204" pitchFamily="34" charset="0"/>
+                <a:cs typeface="Times New Roman" panose="02020603050405020304" pitchFamily="18" charset="0"/>
+              </a:rPr>
+              <a:t>göre uygulanabilir</a:t>
+            </a:r>
+          </a:p>
+          <a:p>
+            <a:pPr marL="0" marR="0" indent="0" algn="just">
+              <a:lnSpc>
+                <a:spcPct val="115000"/>
+              </a:lnSpc>
+              <a:spcBef>
+                <a:spcPts val="0"/>
+              </a:spcBef>
+              <a:spcAft>
+                <a:spcPts val="1000"/>
+              </a:spcAft>
+              <a:buNone/>
+            </a:pPr>
+            <a:r>
+              <a:rPr lang="tr-TR" sz="1800" dirty="0">
+                <a:effectLst/>
+                <a:latin typeface="Times New Roman" panose="02020603050405020304" pitchFamily="18" charset="0"/>
+                <a:ea typeface="Calibri" panose="020F0502020204030204" pitchFamily="34" charset="0"/>
+                <a:cs typeface="Times New Roman" panose="02020603050405020304" pitchFamily="18" charset="0"/>
+              </a:rPr>
+              <a:t>4. Gerçek zamanlı sistemler üzerinden </a:t>
+            </a:r>
+            <a:r>
+              <a:rPr lang="tr-TR" sz="1800" b="1" u="sng" dirty="0">
+                <a:effectLst/>
+                <a:latin typeface="Times New Roman" panose="02020603050405020304" pitchFamily="18" charset="0"/>
+                <a:ea typeface="Calibri" panose="020F0502020204030204" pitchFamily="34" charset="0"/>
+                <a:cs typeface="Times New Roman" panose="02020603050405020304" pitchFamily="18" charset="0"/>
+              </a:rPr>
+              <a:t>ileri zamanlı tahminler </a:t>
+            </a:r>
+            <a:r>
+              <a:rPr lang="tr-TR" sz="1800" dirty="0">
+                <a:effectLst/>
+                <a:latin typeface="Times New Roman" panose="02020603050405020304" pitchFamily="18" charset="0"/>
+                <a:ea typeface="Calibri" panose="020F0502020204030204" pitchFamily="34" charset="0"/>
+                <a:cs typeface="Times New Roman" panose="02020603050405020304" pitchFamily="18" charset="0"/>
+              </a:rPr>
+              <a:t>yapılabilmesini sağlayabilir. </a:t>
+            </a:r>
+            <a:endParaRPr lang="en-US" dirty="0"/>
+          </a:p>
+        </p:txBody>
+      </p:sp>
+    </p:spTree>
+    <p:extLst>
+      <p:ext uri="{BB962C8B-B14F-4D97-AF65-F5344CB8AC3E}">
+        <p14:creationId xmlns:p14="http://schemas.microsoft.com/office/powerpoint/2010/main" val="1613052367"/>
+      </p:ext>
+    </p:extLst>
+  </p:cSld>
+  <p:clrMapOvr>
+    <a:masterClrMapping/>
+  </p:clrMapOvr>
+</p:sld>
+</file>
+
+<file path=ppt/slides/slide28.xml><?xml version="1.0" encoding="utf-8"?>
+<p:sld xmlns:a="http://schemas.openxmlformats.org/drawingml/2006/main" xmlns:r="http://schemas.openxmlformats.org/officeDocument/2006/relationships" xmlns:p="http://schemas.openxmlformats.org/presentationml/2006/main">
+  <p:cSld>
+    <p:spTree>
+      <p:nvGrpSpPr>
+        <p:cNvPr id="1" name=""/>
+        <p:cNvGrpSpPr/>
+        <p:nvPr/>
+      </p:nvGrpSpPr>
+      <p:grpSpPr>
+        <a:xfrm>
+          <a:off x="0" y="0"/>
+          <a:ext cx="0" cy="0"/>
+          <a:chOff x="0" y="0"/>
+          <a:chExt cx="0" cy="0"/>
+        </a:xfrm>
+      </p:grpSpPr>
+      <p:sp>
+        <p:nvSpPr>
+          <p:cNvPr id="2" name="Title 1">
+            <a:extLst>
+              <a:ext uri="{FF2B5EF4-FFF2-40B4-BE49-F238E27FC236}">
                 <a16:creationId xmlns:a16="http://schemas.microsoft.com/office/drawing/2014/main" id="{D08D59E2-2739-4FB1-A9A4-B92F1DBA5F73}"/>
               </a:ext>
             </a:extLst>
@@ -8530,7 +8659,7 @@
 </p:sld>
 </file>
 
-<file path=ppt/slides/slide28.xml><?xml version="1.0" encoding="utf-8"?>
+<file path=ppt/slides/slide29.xml><?xml version="1.0" encoding="utf-8"?>
 <p:sld xmlns:a="http://schemas.openxmlformats.org/drawingml/2006/main" xmlns:r="http://schemas.openxmlformats.org/officeDocument/2006/relationships" xmlns:p="http://schemas.openxmlformats.org/presentationml/2006/main">
   <p:cSld>
     <p:spTree>
@@ -9189,8 +9318,8 @@
               <a:t> </a:t>
             </a:r>
             <a:r>
-              <a:rPr lang="en-US" dirty="0" err="1"/>
-              <a:t>sağlar</a:t>
+              <a:rPr lang="tr-TR" dirty="0"/>
+              <a:t>denir</a:t>
             </a:r>
             <a:r>
               <a:rPr lang="en-US" dirty="0"/>

</xml_diff>